<commit_message>
saved presentation for all-hands meeting
</commit_message>
<xml_diff>
--- a/presentations/2020_10_13_simtest_results.pptx
+++ b/presentations/2020_10_13_simtest_results.pptx
@@ -5394,31 +5394,6 @@
           <a:chExt cx="0" cy="0"/>
         </a:xfrm>
       </p:grpSpPr>
-      <p:sp>
-        <p:nvSpPr>
-          <p:cNvPr id="2" name="Title 1">
-            <a:extLst>
-              <a:ext uri="{FF2B5EF4-FFF2-40B4-BE49-F238E27FC236}">
-                <a16:creationId xmlns:a16="http://schemas.microsoft.com/office/drawing/2014/main" id="{ED0B3AEB-FF92-634A-A4A3-5756037E3DE0}"/>
-              </a:ext>
-            </a:extLst>
-          </p:cNvPr>
-          <p:cNvSpPr>
-            <a:spLocks noGrp="1"/>
-          </p:cNvSpPr>
-          <p:nvPr>
-            <p:ph type="title"/>
-          </p:nvPr>
-        </p:nvSpPr>
-        <p:spPr/>
-        <p:txBody>
-          <a:bodyPr/>
-          <a:lstStyle/>
-          <a:p>
-            <a:endParaRPr lang="en-US"/>
-          </a:p>
-        </p:txBody>
-      </p:sp>
       <p:pic>
         <p:nvPicPr>
           <p:cNvPr id="5" name="Content Placeholder 4">

</xml_diff>

<commit_message>
update figure with a better quality
</commit_message>
<xml_diff>
--- a/presentations/2020_10_13_simtest_results.pptx
+++ b/presentations/2020_10_13_simtest_results.pptx
@@ -111,6 +111,11 @@
       </a:defRPr>
     </a:lvl9pPr>
   </p:defaultTextStyle>
+  <p:extLst>
+    <p:ext uri="{EFAFB233-063F-42B5-8137-9DF3F51BA10A}">
+      <p15:sldGuideLst xmlns:p15="http://schemas.microsoft.com/office/powerpoint/2012/main"/>
+    </p:ext>
+  </p:extLst>
 </p:presentation>
 </file>
 
@@ -196,7 +201,7 @@
           <a:p>
             <a:fld id="{E22F6D81-E7C1-324B-A649-59EC39A678CB}" type="datetimeFigureOut">
               <a:rPr lang="en-US" smtClean="0"/>
-              <a:t>10/13/20</a:t>
+              <a:t>10/13/2020</a:t>
             </a:fld>
             <a:endParaRPr lang="en-US"/>
           </a:p>
@@ -354,7 +359,7 @@
           <a:p>
             <a:fld id="{CE870669-9DFE-A94D-9BAE-DBD1C5F23857}" type="slidenum">
               <a:rPr lang="en-US" smtClean="0"/>
-              <a:t>‹#›</a:t>
+              <a:t>‹nº›</a:t>
             </a:fld>
             <a:endParaRPr lang="en-US"/>
           </a:p>
@@ -705,7 +710,7 @@
           <a:p>
             <a:fld id="{479A09BC-33F3-224C-A895-AAAE5F839369}" type="datetimeFigureOut">
               <a:rPr lang="en-US" smtClean="0"/>
-              <a:t>10/13/20</a:t>
+              <a:t>10/13/2020</a:t>
             </a:fld>
             <a:endParaRPr lang="en-US"/>
           </a:p>
@@ -759,7 +764,7 @@
           <a:p>
             <a:fld id="{192C79DA-C2AF-4245-90F6-A53CB03E1D98}" type="slidenum">
               <a:rPr lang="en-US" smtClean="0"/>
-              <a:t>‹#›</a:t>
+              <a:t>‹nº›</a:t>
             </a:fld>
             <a:endParaRPr lang="en-US"/>
           </a:p>
@@ -903,7 +908,7 @@
           <a:p>
             <a:fld id="{479A09BC-33F3-224C-A895-AAAE5F839369}" type="datetimeFigureOut">
               <a:rPr lang="en-US" smtClean="0"/>
-              <a:t>10/13/20</a:t>
+              <a:t>10/13/2020</a:t>
             </a:fld>
             <a:endParaRPr lang="en-US"/>
           </a:p>
@@ -957,7 +962,7 @@
           <a:p>
             <a:fld id="{192C79DA-C2AF-4245-90F6-A53CB03E1D98}" type="slidenum">
               <a:rPr lang="en-US" smtClean="0"/>
-              <a:t>‹#›</a:t>
+              <a:t>‹nº›</a:t>
             </a:fld>
             <a:endParaRPr lang="en-US"/>
           </a:p>
@@ -1111,7 +1116,7 @@
           <a:p>
             <a:fld id="{479A09BC-33F3-224C-A895-AAAE5F839369}" type="datetimeFigureOut">
               <a:rPr lang="en-US" smtClean="0"/>
-              <a:t>10/13/20</a:t>
+              <a:t>10/13/2020</a:t>
             </a:fld>
             <a:endParaRPr lang="en-US"/>
           </a:p>
@@ -1165,7 +1170,7 @@
           <a:p>
             <a:fld id="{192C79DA-C2AF-4245-90F6-A53CB03E1D98}" type="slidenum">
               <a:rPr lang="en-US" smtClean="0"/>
-              <a:t>‹#›</a:t>
+              <a:t>‹nº›</a:t>
             </a:fld>
             <a:endParaRPr lang="en-US"/>
           </a:p>
@@ -1309,7 +1314,7 @@
           <a:p>
             <a:fld id="{479A09BC-33F3-224C-A895-AAAE5F839369}" type="datetimeFigureOut">
               <a:rPr lang="en-US" smtClean="0"/>
-              <a:t>10/13/20</a:t>
+              <a:t>10/13/2020</a:t>
             </a:fld>
             <a:endParaRPr lang="en-US"/>
           </a:p>
@@ -1363,7 +1368,7 @@
           <a:p>
             <a:fld id="{192C79DA-C2AF-4245-90F6-A53CB03E1D98}" type="slidenum">
               <a:rPr lang="en-US" smtClean="0"/>
-              <a:t>‹#›</a:t>
+              <a:t>‹nº›</a:t>
             </a:fld>
             <a:endParaRPr lang="en-US"/>
           </a:p>
@@ -1584,7 +1589,7 @@
           <a:p>
             <a:fld id="{479A09BC-33F3-224C-A895-AAAE5F839369}" type="datetimeFigureOut">
               <a:rPr lang="en-US" smtClean="0"/>
-              <a:t>10/13/20</a:t>
+              <a:t>10/13/2020</a:t>
             </a:fld>
             <a:endParaRPr lang="en-US"/>
           </a:p>
@@ -1638,7 +1643,7 @@
           <a:p>
             <a:fld id="{192C79DA-C2AF-4245-90F6-A53CB03E1D98}" type="slidenum">
               <a:rPr lang="en-US" smtClean="0"/>
-              <a:t>‹#›</a:t>
+              <a:t>‹nº›</a:t>
             </a:fld>
             <a:endParaRPr lang="en-US"/>
           </a:p>
@@ -1849,7 +1854,7 @@
           <a:p>
             <a:fld id="{479A09BC-33F3-224C-A895-AAAE5F839369}" type="datetimeFigureOut">
               <a:rPr lang="en-US" smtClean="0"/>
-              <a:t>10/13/20</a:t>
+              <a:t>10/13/2020</a:t>
             </a:fld>
             <a:endParaRPr lang="en-US"/>
           </a:p>
@@ -1903,7 +1908,7 @@
           <a:p>
             <a:fld id="{192C79DA-C2AF-4245-90F6-A53CB03E1D98}" type="slidenum">
               <a:rPr lang="en-US" smtClean="0"/>
-              <a:t>‹#›</a:t>
+              <a:t>‹nº›</a:t>
             </a:fld>
             <a:endParaRPr lang="en-US"/>
           </a:p>
@@ -2261,7 +2266,7 @@
           <a:p>
             <a:fld id="{479A09BC-33F3-224C-A895-AAAE5F839369}" type="datetimeFigureOut">
               <a:rPr lang="en-US" smtClean="0"/>
-              <a:t>10/13/20</a:t>
+              <a:t>10/13/2020</a:t>
             </a:fld>
             <a:endParaRPr lang="en-US"/>
           </a:p>
@@ -2315,7 +2320,7 @@
           <a:p>
             <a:fld id="{192C79DA-C2AF-4245-90F6-A53CB03E1D98}" type="slidenum">
               <a:rPr lang="en-US" smtClean="0"/>
-              <a:t>‹#›</a:t>
+              <a:t>‹nº›</a:t>
             </a:fld>
             <a:endParaRPr lang="en-US"/>
           </a:p>
@@ -2402,7 +2407,7 @@
           <a:p>
             <a:fld id="{479A09BC-33F3-224C-A895-AAAE5F839369}" type="datetimeFigureOut">
               <a:rPr lang="en-US" smtClean="0"/>
-              <a:t>10/13/20</a:t>
+              <a:t>10/13/2020</a:t>
             </a:fld>
             <a:endParaRPr lang="en-US"/>
           </a:p>
@@ -2456,7 +2461,7 @@
           <a:p>
             <a:fld id="{192C79DA-C2AF-4245-90F6-A53CB03E1D98}" type="slidenum">
               <a:rPr lang="en-US" smtClean="0"/>
-              <a:t>‹#›</a:t>
+              <a:t>‹nº›</a:t>
             </a:fld>
             <a:endParaRPr lang="en-US"/>
           </a:p>
@@ -2515,7 +2520,7 @@
           <a:p>
             <a:fld id="{479A09BC-33F3-224C-A895-AAAE5F839369}" type="datetimeFigureOut">
               <a:rPr lang="en-US" smtClean="0"/>
-              <a:t>10/13/20</a:t>
+              <a:t>10/13/2020</a:t>
             </a:fld>
             <a:endParaRPr lang="en-US"/>
           </a:p>
@@ -2569,7 +2574,7 @@
           <a:p>
             <a:fld id="{192C79DA-C2AF-4245-90F6-A53CB03E1D98}" type="slidenum">
               <a:rPr lang="en-US" smtClean="0"/>
-              <a:t>‹#›</a:t>
+              <a:t>‹nº›</a:t>
             </a:fld>
             <a:endParaRPr lang="en-US"/>
           </a:p>
@@ -2826,7 +2831,7 @@
           <a:p>
             <a:fld id="{479A09BC-33F3-224C-A895-AAAE5F839369}" type="datetimeFigureOut">
               <a:rPr lang="en-US" smtClean="0"/>
-              <a:t>10/13/20</a:t>
+              <a:t>10/13/2020</a:t>
             </a:fld>
             <a:endParaRPr lang="en-US"/>
           </a:p>
@@ -2880,7 +2885,7 @@
           <a:p>
             <a:fld id="{192C79DA-C2AF-4245-90F6-A53CB03E1D98}" type="slidenum">
               <a:rPr lang="en-US" smtClean="0"/>
-              <a:t>‹#›</a:t>
+              <a:t>‹nº›</a:t>
             </a:fld>
             <a:endParaRPr lang="en-US"/>
           </a:p>
@@ -3114,7 +3119,7 @@
           <a:p>
             <a:fld id="{479A09BC-33F3-224C-A895-AAAE5F839369}" type="datetimeFigureOut">
               <a:rPr lang="en-US" smtClean="0"/>
-              <a:t>10/13/20</a:t>
+              <a:t>10/13/2020</a:t>
             </a:fld>
             <a:endParaRPr lang="en-US"/>
           </a:p>
@@ -3168,7 +3173,7 @@
           <a:p>
             <a:fld id="{192C79DA-C2AF-4245-90F6-A53CB03E1D98}" type="slidenum">
               <a:rPr lang="en-US" smtClean="0"/>
-              <a:t>‹#›</a:t>
+              <a:t>‹nº›</a:t>
             </a:fld>
             <a:endParaRPr lang="en-US"/>
           </a:p>
@@ -3355,7 +3360,7 @@
           <a:p>
             <a:fld id="{479A09BC-33F3-224C-A895-AAAE5F839369}" type="datetimeFigureOut">
               <a:rPr lang="en-US" smtClean="0"/>
-              <a:t>10/13/20</a:t>
+              <a:t>10/13/2020</a:t>
             </a:fld>
             <a:endParaRPr lang="en-US"/>
           </a:p>
@@ -3445,7 +3450,7 @@
           <a:p>
             <a:fld id="{192C79DA-C2AF-4245-90F6-A53CB03E1D98}" type="slidenum">
               <a:rPr lang="en-US" smtClean="0"/>
-              <a:t>‹#›</a:t>
+              <a:t>‹nº›</a:t>
             </a:fld>
             <a:endParaRPr lang="en-US"/>
           </a:p>
@@ -3880,10 +3885,10 @@
       </p:grpSpPr>
       <p:pic>
         <p:nvPicPr>
-          <p:cNvPr id="5" name="Picture 4">
-            <a:extLst>
-              <a:ext uri="{FF2B5EF4-FFF2-40B4-BE49-F238E27FC236}">
-                <a16:creationId xmlns:a16="http://schemas.microsoft.com/office/drawing/2014/main" id="{133996D6-8537-FD4C-98E8-401C607164F6}"/>
+          <p:cNvPr id="3" name="Imagem 2">
+            <a:extLst>
+              <a:ext uri="{FF2B5EF4-FFF2-40B4-BE49-F238E27FC236}">
+                <a16:creationId xmlns:a16="http://schemas.microsoft.com/office/drawing/2014/main" id="{E8188B2E-DFCD-4BFF-B51E-DD0408CB7DA6}"/>
               </a:ext>
             </a:extLst>
           </p:cNvPr>
@@ -3900,8 +3905,8 @@
         </p:blipFill>
         <p:spPr>
           <a:xfrm>
-            <a:off x="885825" y="1094571"/>
-            <a:ext cx="10376038" cy="4649004"/>
+            <a:off x="2182834" y="608424"/>
+            <a:ext cx="7826332" cy="5869749"/>
           </a:xfrm>
           <a:prstGeom prst="rect">
             <a:avLst/>
@@ -4625,8 +4630,8 @@
           </a:fontRef>
         </p:style>
       </p:cxnSp>
-      <mc:AlternateContent xmlns:mc="http://schemas.openxmlformats.org/markup-compatibility/2006">
-        <mc:Choice xmlns:a14="http://schemas.microsoft.com/office/drawing/2010/main" Requires="a14">
+      <mc:AlternateContent xmlns:mc="http://schemas.openxmlformats.org/markup-compatibility/2006" xmlns:a14="http://schemas.microsoft.com/office/drawing/2010/main">
+        <mc:Choice Requires="a14">
           <p:sp>
             <p:nvSpPr>
               <p:cNvPr id="12" name="TextBox 11">
@@ -4938,7 +4943,7 @@
             </p:txBody>
           </p:sp>
         </mc:Choice>
-        <mc:Fallback>
+        <mc:Fallback xmlns="">
           <p:sp>
             <p:nvSpPr>
               <p:cNvPr id="12" name="TextBox 11">

</xml_diff>

<commit_message>
wrote function to run power analysis across different numbers of time steps
</commit_message>
<xml_diff>
--- a/presentations/2020_10_13_simtest_results.pptx
+++ b/presentations/2020_10_13_simtest_results.pptx
@@ -5,7 +5,7 @@
     <p:sldMasterId id="2147483648" r:id="rId1"/>
   </p:sldMasterIdLst>
   <p:notesMasterIdLst>
-    <p:notesMasterId r:id="rId7"/>
+    <p:notesMasterId r:id="rId8"/>
   </p:notesMasterIdLst>
   <p:sldIdLst>
     <p:sldId id="256" r:id="rId2"/>
@@ -13,6 +13,7 @@
     <p:sldId id="355" r:id="rId4"/>
     <p:sldId id="258" r:id="rId5"/>
     <p:sldId id="356" r:id="rId6"/>
+    <p:sldId id="357" r:id="rId7"/>
   </p:sldIdLst>
   <p:sldSz cx="12192000" cy="6858000"/>
   <p:notesSz cx="6858000" cy="9144000"/>
@@ -201,7 +202,7 @@
           <a:p>
             <a:fld id="{E22F6D81-E7C1-324B-A649-59EC39A678CB}" type="datetimeFigureOut">
               <a:rPr lang="en-US" smtClean="0"/>
-              <a:t>10/13/2020</a:t>
+              <a:t>10/13/20</a:t>
             </a:fld>
             <a:endParaRPr lang="en-US"/>
           </a:p>
@@ -359,7 +360,7 @@
           <a:p>
             <a:fld id="{CE870669-9DFE-A94D-9BAE-DBD1C5F23857}" type="slidenum">
               <a:rPr lang="en-US" smtClean="0"/>
-              <a:t>‹nº›</a:t>
+              <a:t>‹#›</a:t>
             </a:fld>
             <a:endParaRPr lang="en-US"/>
           </a:p>
@@ -710,7 +711,7 @@
           <a:p>
             <a:fld id="{479A09BC-33F3-224C-A895-AAAE5F839369}" type="datetimeFigureOut">
               <a:rPr lang="en-US" smtClean="0"/>
-              <a:t>10/13/2020</a:t>
+              <a:t>10/13/20</a:t>
             </a:fld>
             <a:endParaRPr lang="en-US"/>
           </a:p>
@@ -764,7 +765,7 @@
           <a:p>
             <a:fld id="{192C79DA-C2AF-4245-90F6-A53CB03E1D98}" type="slidenum">
               <a:rPr lang="en-US" smtClean="0"/>
-              <a:t>‹nº›</a:t>
+              <a:t>‹#›</a:t>
             </a:fld>
             <a:endParaRPr lang="en-US"/>
           </a:p>
@@ -908,7 +909,7 @@
           <a:p>
             <a:fld id="{479A09BC-33F3-224C-A895-AAAE5F839369}" type="datetimeFigureOut">
               <a:rPr lang="en-US" smtClean="0"/>
-              <a:t>10/13/2020</a:t>
+              <a:t>10/13/20</a:t>
             </a:fld>
             <a:endParaRPr lang="en-US"/>
           </a:p>
@@ -962,7 +963,7 @@
           <a:p>
             <a:fld id="{192C79DA-C2AF-4245-90F6-A53CB03E1D98}" type="slidenum">
               <a:rPr lang="en-US" smtClean="0"/>
-              <a:t>‹nº›</a:t>
+              <a:t>‹#›</a:t>
             </a:fld>
             <a:endParaRPr lang="en-US"/>
           </a:p>
@@ -1116,7 +1117,7 @@
           <a:p>
             <a:fld id="{479A09BC-33F3-224C-A895-AAAE5F839369}" type="datetimeFigureOut">
               <a:rPr lang="en-US" smtClean="0"/>
-              <a:t>10/13/2020</a:t>
+              <a:t>10/13/20</a:t>
             </a:fld>
             <a:endParaRPr lang="en-US"/>
           </a:p>
@@ -1170,7 +1171,7 @@
           <a:p>
             <a:fld id="{192C79DA-C2AF-4245-90F6-A53CB03E1D98}" type="slidenum">
               <a:rPr lang="en-US" smtClean="0"/>
-              <a:t>‹nº›</a:t>
+              <a:t>‹#›</a:t>
             </a:fld>
             <a:endParaRPr lang="en-US"/>
           </a:p>
@@ -1314,7 +1315,7 @@
           <a:p>
             <a:fld id="{479A09BC-33F3-224C-A895-AAAE5F839369}" type="datetimeFigureOut">
               <a:rPr lang="en-US" smtClean="0"/>
-              <a:t>10/13/2020</a:t>
+              <a:t>10/13/20</a:t>
             </a:fld>
             <a:endParaRPr lang="en-US"/>
           </a:p>
@@ -1368,7 +1369,7 @@
           <a:p>
             <a:fld id="{192C79DA-C2AF-4245-90F6-A53CB03E1D98}" type="slidenum">
               <a:rPr lang="en-US" smtClean="0"/>
-              <a:t>‹nº›</a:t>
+              <a:t>‹#›</a:t>
             </a:fld>
             <a:endParaRPr lang="en-US"/>
           </a:p>
@@ -1589,7 +1590,7 @@
           <a:p>
             <a:fld id="{479A09BC-33F3-224C-A895-AAAE5F839369}" type="datetimeFigureOut">
               <a:rPr lang="en-US" smtClean="0"/>
-              <a:t>10/13/2020</a:t>
+              <a:t>10/13/20</a:t>
             </a:fld>
             <a:endParaRPr lang="en-US"/>
           </a:p>
@@ -1643,7 +1644,7 @@
           <a:p>
             <a:fld id="{192C79DA-C2AF-4245-90F6-A53CB03E1D98}" type="slidenum">
               <a:rPr lang="en-US" smtClean="0"/>
-              <a:t>‹nº›</a:t>
+              <a:t>‹#›</a:t>
             </a:fld>
             <a:endParaRPr lang="en-US"/>
           </a:p>
@@ -1854,7 +1855,7 @@
           <a:p>
             <a:fld id="{479A09BC-33F3-224C-A895-AAAE5F839369}" type="datetimeFigureOut">
               <a:rPr lang="en-US" smtClean="0"/>
-              <a:t>10/13/2020</a:t>
+              <a:t>10/13/20</a:t>
             </a:fld>
             <a:endParaRPr lang="en-US"/>
           </a:p>
@@ -1908,7 +1909,7 @@
           <a:p>
             <a:fld id="{192C79DA-C2AF-4245-90F6-A53CB03E1D98}" type="slidenum">
               <a:rPr lang="en-US" smtClean="0"/>
-              <a:t>‹nº›</a:t>
+              <a:t>‹#›</a:t>
             </a:fld>
             <a:endParaRPr lang="en-US"/>
           </a:p>
@@ -2266,7 +2267,7 @@
           <a:p>
             <a:fld id="{479A09BC-33F3-224C-A895-AAAE5F839369}" type="datetimeFigureOut">
               <a:rPr lang="en-US" smtClean="0"/>
-              <a:t>10/13/2020</a:t>
+              <a:t>10/13/20</a:t>
             </a:fld>
             <a:endParaRPr lang="en-US"/>
           </a:p>
@@ -2320,7 +2321,7 @@
           <a:p>
             <a:fld id="{192C79DA-C2AF-4245-90F6-A53CB03E1D98}" type="slidenum">
               <a:rPr lang="en-US" smtClean="0"/>
-              <a:t>‹nº›</a:t>
+              <a:t>‹#›</a:t>
             </a:fld>
             <a:endParaRPr lang="en-US"/>
           </a:p>
@@ -2407,7 +2408,7 @@
           <a:p>
             <a:fld id="{479A09BC-33F3-224C-A895-AAAE5F839369}" type="datetimeFigureOut">
               <a:rPr lang="en-US" smtClean="0"/>
-              <a:t>10/13/2020</a:t>
+              <a:t>10/13/20</a:t>
             </a:fld>
             <a:endParaRPr lang="en-US"/>
           </a:p>
@@ -2461,7 +2462,7 @@
           <a:p>
             <a:fld id="{192C79DA-C2AF-4245-90F6-A53CB03E1D98}" type="slidenum">
               <a:rPr lang="en-US" smtClean="0"/>
-              <a:t>‹nº›</a:t>
+              <a:t>‹#›</a:t>
             </a:fld>
             <a:endParaRPr lang="en-US"/>
           </a:p>
@@ -2520,7 +2521,7 @@
           <a:p>
             <a:fld id="{479A09BC-33F3-224C-A895-AAAE5F839369}" type="datetimeFigureOut">
               <a:rPr lang="en-US" smtClean="0"/>
-              <a:t>10/13/2020</a:t>
+              <a:t>10/13/20</a:t>
             </a:fld>
             <a:endParaRPr lang="en-US"/>
           </a:p>
@@ -2574,7 +2575,7 @@
           <a:p>
             <a:fld id="{192C79DA-C2AF-4245-90F6-A53CB03E1D98}" type="slidenum">
               <a:rPr lang="en-US" smtClean="0"/>
-              <a:t>‹nº›</a:t>
+              <a:t>‹#›</a:t>
             </a:fld>
             <a:endParaRPr lang="en-US"/>
           </a:p>
@@ -2831,7 +2832,7 @@
           <a:p>
             <a:fld id="{479A09BC-33F3-224C-A895-AAAE5F839369}" type="datetimeFigureOut">
               <a:rPr lang="en-US" smtClean="0"/>
-              <a:t>10/13/2020</a:t>
+              <a:t>10/13/20</a:t>
             </a:fld>
             <a:endParaRPr lang="en-US"/>
           </a:p>
@@ -2885,7 +2886,7 @@
           <a:p>
             <a:fld id="{192C79DA-C2AF-4245-90F6-A53CB03E1D98}" type="slidenum">
               <a:rPr lang="en-US" smtClean="0"/>
-              <a:t>‹nº›</a:t>
+              <a:t>‹#›</a:t>
             </a:fld>
             <a:endParaRPr lang="en-US"/>
           </a:p>
@@ -3119,7 +3120,7 @@
           <a:p>
             <a:fld id="{479A09BC-33F3-224C-A895-AAAE5F839369}" type="datetimeFigureOut">
               <a:rPr lang="en-US" smtClean="0"/>
-              <a:t>10/13/2020</a:t>
+              <a:t>10/13/20</a:t>
             </a:fld>
             <a:endParaRPr lang="en-US"/>
           </a:p>
@@ -3173,7 +3174,7 @@
           <a:p>
             <a:fld id="{192C79DA-C2AF-4245-90F6-A53CB03E1D98}" type="slidenum">
               <a:rPr lang="en-US" smtClean="0"/>
-              <a:t>‹nº›</a:t>
+              <a:t>‹#›</a:t>
             </a:fld>
             <a:endParaRPr lang="en-US"/>
           </a:p>
@@ -3360,7 +3361,7 @@
           <a:p>
             <a:fld id="{479A09BC-33F3-224C-A895-AAAE5F839369}" type="datetimeFigureOut">
               <a:rPr lang="en-US" smtClean="0"/>
-              <a:t>10/13/2020</a:t>
+              <a:t>10/13/20</a:t>
             </a:fld>
             <a:endParaRPr lang="en-US"/>
           </a:p>
@@ -3450,7 +3451,7 @@
           <a:p>
             <a:fld id="{192C79DA-C2AF-4245-90F6-A53CB03E1D98}" type="slidenum">
               <a:rPr lang="en-US" smtClean="0"/>
-              <a:t>‹nº›</a:t>
+              <a:t>‹#›</a:t>
             </a:fld>
             <a:endParaRPr lang="en-US"/>
           </a:p>
@@ -5441,6 +5442,90 @@
 </p:sld>
 </file>
 
+<file path=ppt/slides/slide6.xml><?xml version="1.0" encoding="utf-8"?>
+<p:sld xmlns:a="http://schemas.openxmlformats.org/drawingml/2006/main" xmlns:r="http://schemas.openxmlformats.org/officeDocument/2006/relationships" xmlns:p="http://schemas.openxmlformats.org/presentationml/2006/main">
+  <p:cSld>
+    <p:spTree>
+      <p:nvGrpSpPr>
+        <p:cNvPr id="1" name=""/>
+        <p:cNvGrpSpPr/>
+        <p:nvPr/>
+      </p:nvGrpSpPr>
+      <p:grpSpPr>
+        <a:xfrm>
+          <a:off x="0" y="0"/>
+          <a:ext cx="0" cy="0"/>
+          <a:chOff x="0" y="0"/>
+          <a:chExt cx="0" cy="0"/>
+        </a:xfrm>
+      </p:grpSpPr>
+      <p:sp>
+        <p:nvSpPr>
+          <p:cNvPr id="2" name="Title 1">
+            <a:extLst>
+              <a:ext uri="{FF2B5EF4-FFF2-40B4-BE49-F238E27FC236}">
+                <a16:creationId xmlns:a16="http://schemas.microsoft.com/office/drawing/2014/main" id="{C5C04C3D-A540-FE4B-940E-5652D272CFDA}"/>
+              </a:ext>
+            </a:extLst>
+          </p:cNvPr>
+          <p:cNvSpPr>
+            <a:spLocks noGrp="1"/>
+          </p:cNvSpPr>
+          <p:nvPr>
+            <p:ph type="title"/>
+          </p:nvPr>
+        </p:nvSpPr>
+        <p:spPr>
+          <a:xfrm>
+            <a:off x="851847" y="2535119"/>
+            <a:ext cx="10515600" cy="1325563"/>
+          </a:xfrm>
+        </p:spPr>
+        <p:txBody>
+          <a:bodyPr/>
+          <a:lstStyle/>
+          <a:p>
+            <a:r>
+              <a:rPr lang="en-US" dirty="0"/>
+              <a:t>https://</a:t>
+            </a:r>
+            <a:r>
+              <a:rPr lang="en-US" dirty="0" err="1"/>
+              <a:t>github.com</a:t>
+            </a:r>
+            <a:r>
+              <a:rPr lang="en-US" dirty="0"/>
+              <a:t>/</a:t>
+            </a:r>
+            <a:r>
+              <a:rPr lang="en-US" dirty="0" err="1"/>
+              <a:t>abigailgolden</a:t>
+            </a:r>
+            <a:r>
+              <a:rPr lang="en-US" dirty="0"/>
+              <a:t>/</a:t>
+            </a:r>
+            <a:r>
+              <a:rPr lang="en-US" dirty="0" err="1"/>
+              <a:t>gillsonice</a:t>
+            </a:r>
+            <a:endParaRPr lang="en-US" dirty="0"/>
+          </a:p>
+        </p:txBody>
+      </p:sp>
+    </p:spTree>
+    <p:extLst>
+      <p:ext uri="{BB962C8B-B14F-4D97-AF65-F5344CB8AC3E}">
+        <p14:creationId xmlns:p14="http://schemas.microsoft.com/office/powerpoint/2010/main" val="1687985419"/>
+      </p:ext>
+    </p:extLst>
+  </p:cSld>
+  <p:clrMapOvr>
+    <a:masterClrMapping/>
+  </p:clrMapOvr>
+</p:sld>
+</file>
+
 <file path=ppt/theme/theme1.xml><?xml version="1.0" encoding="utf-8"?>
 <a:theme xmlns:a="http://schemas.openxmlformats.org/drawingml/2006/main" name="Office Theme">
   <a:themeElements>

</xml_diff>